<commit_message>
updates to Module 8
</commit_message>
<xml_diff>
--- a/Slides/Lesson 8.4 Searching in a Graph.pptx
+++ b/Slides/Lesson 8.4 Searching in a Graph.pptx
@@ -261,7 +261,7 @@
             <a:fld id="{CF8F25F6-E1EF-4065-8525-42EDEBD9BD22}" type="datetimeFigureOut">
               <a:rPr lang="en-US" smtClean="0"/>
               <a:pPr/>
-              <a:t>10/26/2015</a:t>
+              <a:t>10/31/2015</a:t>
             </a:fld>
             <a:endParaRPr lang="en-US"/>
           </a:p>
@@ -1310,7 +1310,7 @@
           <a:p>
             <a:fld id="{2F1F79F5-7BEC-496A-AFC7-876E38F64D71}" type="datetime1">
               <a:rPr lang="en-US" smtClean="0"/>
-              <a:t>10/26/2015</a:t>
+              <a:t>10/31/2015</a:t>
             </a:fld>
             <a:endParaRPr lang="en-US"/>
           </a:p>
@@ -1412,7 +1412,7 @@
           <a:p>
             <a:fld id="{0A05703A-7669-4FEA-9056-25299B4D29D4}" type="datetime1">
               <a:rPr lang="en-US" smtClean="0"/>
-              <a:t>10/26/2015</a:t>
+              <a:t>10/31/2015</a:t>
             </a:fld>
             <a:endParaRPr lang="en-US"/>
           </a:p>
@@ -1689,7 +1689,7 @@
           <a:p>
             <a:fld id="{6E5077B5-BB57-49DB-88CA-226A139E5C01}" type="datetime1">
               <a:rPr lang="en-US" smtClean="0"/>
-              <a:t>10/26/2015</a:t>
+              <a:t>10/31/2015</a:t>
             </a:fld>
             <a:endParaRPr lang="en-US"/>
           </a:p>
@@ -1942,7 +1942,7 @@
           <a:p>
             <a:fld id="{C48D9447-CBD6-49A1-89FD-8512A8CF8999}" type="datetime1">
               <a:rPr lang="en-US" smtClean="0"/>
-              <a:t>10/26/2015</a:t>
+              <a:t>10/31/2015</a:t>
             </a:fld>
             <a:endParaRPr lang="en-US"/>
           </a:p>
@@ -2112,7 +2112,7 @@
           <a:p>
             <a:fld id="{A3639A2A-823D-48B7-9ACE-7FAF42870BA9}" type="datetime1">
               <a:rPr lang="en-US" smtClean="0"/>
-              <a:t>10/26/2015</a:t>
+              <a:t>10/31/2015</a:t>
             </a:fld>
             <a:endParaRPr lang="en-US"/>
           </a:p>
@@ -2292,7 +2292,7 @@
           <a:p>
             <a:fld id="{ED1B6996-82E9-463C-972C-7B56056E426C}" type="datetime1">
               <a:rPr lang="en-US" smtClean="0"/>
-              <a:t>10/26/2015</a:t>
+              <a:t>10/31/2015</a:t>
             </a:fld>
             <a:endParaRPr lang="en-US"/>
           </a:p>
@@ -2468,7 +2468,7 @@
           <a:p>
             <a:fld id="{E22ED4DA-448D-4BB1-B935-CC112220207B}" type="datetime1">
               <a:rPr lang="en-US" smtClean="0"/>
-              <a:t>10/26/2015</a:t>
+              <a:t>10/31/2015</a:t>
             </a:fld>
             <a:endParaRPr lang="en-US"/>
           </a:p>
@@ -2650,7 +2650,7 @@
           <a:p>
             <a:fld id="{E22ED4DA-448D-4BB1-B935-CC112220207B}" type="datetime1">
               <a:rPr lang="en-US" smtClean="0"/>
-              <a:t>10/26/2015</a:t>
+              <a:t>10/31/2015</a:t>
             </a:fld>
             <a:endParaRPr lang="en-US"/>
           </a:p>
@@ -2919,7 +2919,7 @@
           <a:p>
             <a:fld id="{FF5D65A6-AB94-4435-B0B7-3743215FA46C}" type="datetime1">
               <a:rPr lang="en-US" smtClean="0"/>
-              <a:t>10/26/2015</a:t>
+              <a:t>10/31/2015</a:t>
             </a:fld>
             <a:endParaRPr lang="en-US"/>
           </a:p>
@@ -3104,7 +3104,7 @@
           <a:p>
             <a:fld id="{FF5D65A6-AB94-4435-B0B7-3743215FA46C}" type="datetime1">
               <a:rPr lang="en-US" smtClean="0"/>
-              <a:t>10/26/2015</a:t>
+              <a:t>10/31/2015</a:t>
             </a:fld>
             <a:endParaRPr lang="en-US"/>
           </a:p>
@@ -3406,7 +3406,7 @@
           <a:p>
             <a:fld id="{7C193DC4-6EF0-48C9-B29C-616106A645E1}" type="datetime1">
               <a:rPr lang="en-US" smtClean="0"/>
-              <a:t>10/26/2015</a:t>
+              <a:t>10/31/2015</a:t>
             </a:fld>
             <a:endParaRPr lang="en-US"/>
           </a:p>
@@ -3694,7 +3694,7 @@
           <a:p>
             <a:fld id="{5D1846AD-9252-4647-9435-4C2AC365653A}" type="datetime1">
               <a:rPr lang="en-US" smtClean="0"/>
-              <a:t>10/26/2015</a:t>
+              <a:t>10/31/2015</a:t>
             </a:fld>
             <a:endParaRPr lang="en-US"/>
           </a:p>
@@ -4116,7 +4116,7 @@
           <a:p>
             <a:fld id="{CE56DC10-3561-4063-A6AF-C1CC7A41040A}" type="datetime1">
               <a:rPr lang="en-US" smtClean="0"/>
-              <a:t>10/26/2015</a:t>
+              <a:t>10/31/2015</a:t>
             </a:fld>
             <a:endParaRPr lang="en-US"/>
           </a:p>
@@ -4234,7 +4234,7 @@
           <a:p>
             <a:fld id="{2F7B77F5-1464-4F6B-92A8-64FC8A508293}" type="datetime1">
               <a:rPr lang="en-US" smtClean="0"/>
-              <a:t>10/26/2015</a:t>
+              <a:t>10/31/2015</a:t>
             </a:fld>
             <a:endParaRPr lang="en-US"/>
           </a:p>
@@ -4466,7 +4466,7 @@
           <a:p>
             <a:fld id="{02B3F677-983B-48DB-ADFD-63FE6CBC7FB2}" type="datetime1">
               <a:rPr lang="en-US" smtClean="0"/>
-              <a:t>10/26/2015</a:t>
+              <a:t>10/31/2015</a:t>
             </a:fld>
             <a:endParaRPr lang="en-US"/>
           </a:p>
@@ -5065,7 +5065,6 @@
                 <a:rPr lang="en-US" sz="1000" dirty="0" smtClean="0"/>
                 <a:t>2012-2015</a:t>
               </a:r>
-              <a:endParaRPr lang="en-US" sz="1000" dirty="0" smtClean="0"/>
             </a:p>
             <a:p>
               <a:r>
@@ -18014,7 +18013,15 @@
             <a:pPr lvl="1"/>
             <a:r>
               <a:rPr lang="en-US" dirty="0"/>
-              <a:t>explain what a directed graph is, and it means for one node to be reachable from another</a:t>
+              <a:t>explain what a directed graph is, and </a:t>
+            </a:r>
+            <a:r>
+              <a:rPr lang="en-US" dirty="0" smtClean="0"/>
+              <a:t>what  it </a:t>
+            </a:r>
+            <a:r>
+              <a:rPr lang="en-US" dirty="0"/>
+              <a:t>means for one node to be reachable from another</a:t>
             </a:r>
           </a:p>
           <a:p>
@@ -18338,21 +18345,13 @@
           <a:p>
             <a:r>
               <a:rPr lang="en-US" dirty="0" smtClean="0"/>
-              <a:t>Just define a </a:t>
-            </a:r>
+              <a:t>Just define a successors function from scratch, and then define all-successors using a HOF.</a:t>
+            </a:r>
+          </a:p>
+          <a:p>
             <a:r>
               <a:rPr lang="en-US" dirty="0" smtClean="0"/>
-              <a:t>successors function from scratch, and then define all-successors using a HOF.</a:t>
-            </a:r>
-          </a:p>
-          <a:p>
-            <a:r>
-              <a:rPr lang="en-US" dirty="0" smtClean="0"/>
-              <a:t>Good </a:t>
-            </a:r>
-            <a:r>
-              <a:rPr lang="en-US" dirty="0" smtClean="0"/>
-              <a:t>thing to do if your graph is very large– e.g. Rubik’s cube. </a:t>
+              <a:t>Good thing to do if your graph is very large– e.g. Rubik’s cube. </a:t>
             </a:r>
           </a:p>
         </p:txBody>
@@ -18650,11 +18649,7 @@
           <a:p>
             <a:r>
               <a:rPr lang="en-US" dirty="0" smtClean="0"/>
-              <a:t>From </a:t>
-            </a:r>
-            <a:r>
-              <a:rPr lang="en-US" dirty="0" smtClean="0"/>
-              <a:t>Examples/08-5a-implicit-graphs.rkt</a:t>
+              <a:t>From Examples/08-5a-implicit-graphs.rkt</a:t>
             </a:r>
             <a:endParaRPr lang="en-US" dirty="0"/>
           </a:p>
@@ -20278,7 +20273,19 @@
             <a:pPr lvl="1"/>
             <a:r>
               <a:rPr lang="en-US" dirty="0" smtClean="0"/>
-              <a:t>explain what a directed graph is, and it means for one node to be reachable from another</a:t>
+              <a:t>explain what a directed graph is, </a:t>
+            </a:r>
+            <a:r>
+              <a:rPr lang="en-US" smtClean="0"/>
+              <a:t>and </a:t>
+            </a:r>
+            <a:r>
+              <a:rPr lang="en-US" smtClean="0"/>
+              <a:t>what it </a:t>
+            </a:r>
+            <a:r>
+              <a:rPr lang="en-US" dirty="0" smtClean="0"/>
+              <a:t>means for one node to be reachable from another</a:t>
             </a:r>
           </a:p>
           <a:p>

</xml_diff>

<commit_message>
fixed typo in gp08-3, updating slides for Modules 8-9
</commit_message>
<xml_diff>
--- a/Slides/Lesson 8.4 Searching in a Graph.pptx
+++ b/Slides/Lesson 8.4 Searching in a Graph.pptx
@@ -261,7 +261,7 @@
             <a:fld id="{CF8F25F6-E1EF-4065-8525-42EDEBD9BD22}" type="datetimeFigureOut">
               <a:rPr lang="en-US" smtClean="0"/>
               <a:pPr/>
-              <a:t>10/31/2015</a:t>
+              <a:t>11/3/2015</a:t>
             </a:fld>
             <a:endParaRPr lang="en-US"/>
           </a:p>
@@ -1310,7 +1310,7 @@
           <a:p>
             <a:fld id="{2F1F79F5-7BEC-496A-AFC7-876E38F64D71}" type="datetime1">
               <a:rPr lang="en-US" smtClean="0"/>
-              <a:t>10/31/2015</a:t>
+              <a:t>11/3/2015</a:t>
             </a:fld>
             <a:endParaRPr lang="en-US"/>
           </a:p>
@@ -1412,7 +1412,7 @@
           <a:p>
             <a:fld id="{0A05703A-7669-4FEA-9056-25299B4D29D4}" type="datetime1">
               <a:rPr lang="en-US" smtClean="0"/>
-              <a:t>10/31/2015</a:t>
+              <a:t>11/3/2015</a:t>
             </a:fld>
             <a:endParaRPr lang="en-US"/>
           </a:p>
@@ -1689,7 +1689,7 @@
           <a:p>
             <a:fld id="{6E5077B5-BB57-49DB-88CA-226A139E5C01}" type="datetime1">
               <a:rPr lang="en-US" smtClean="0"/>
-              <a:t>10/31/2015</a:t>
+              <a:t>11/3/2015</a:t>
             </a:fld>
             <a:endParaRPr lang="en-US"/>
           </a:p>
@@ -1942,7 +1942,7 @@
           <a:p>
             <a:fld id="{C48D9447-CBD6-49A1-89FD-8512A8CF8999}" type="datetime1">
               <a:rPr lang="en-US" smtClean="0"/>
-              <a:t>10/31/2015</a:t>
+              <a:t>11/3/2015</a:t>
             </a:fld>
             <a:endParaRPr lang="en-US"/>
           </a:p>
@@ -2112,7 +2112,7 @@
           <a:p>
             <a:fld id="{A3639A2A-823D-48B7-9ACE-7FAF42870BA9}" type="datetime1">
               <a:rPr lang="en-US" smtClean="0"/>
-              <a:t>10/31/2015</a:t>
+              <a:t>11/3/2015</a:t>
             </a:fld>
             <a:endParaRPr lang="en-US"/>
           </a:p>
@@ -2292,7 +2292,7 @@
           <a:p>
             <a:fld id="{ED1B6996-82E9-463C-972C-7B56056E426C}" type="datetime1">
               <a:rPr lang="en-US" smtClean="0"/>
-              <a:t>10/31/2015</a:t>
+              <a:t>11/3/2015</a:t>
             </a:fld>
             <a:endParaRPr lang="en-US"/>
           </a:p>
@@ -2468,7 +2468,7 @@
           <a:p>
             <a:fld id="{E22ED4DA-448D-4BB1-B935-CC112220207B}" type="datetime1">
               <a:rPr lang="en-US" smtClean="0"/>
-              <a:t>10/31/2015</a:t>
+              <a:t>11/3/2015</a:t>
             </a:fld>
             <a:endParaRPr lang="en-US"/>
           </a:p>
@@ -2650,7 +2650,7 @@
           <a:p>
             <a:fld id="{E22ED4DA-448D-4BB1-B935-CC112220207B}" type="datetime1">
               <a:rPr lang="en-US" smtClean="0"/>
-              <a:t>10/31/2015</a:t>
+              <a:t>11/3/2015</a:t>
             </a:fld>
             <a:endParaRPr lang="en-US"/>
           </a:p>
@@ -2919,7 +2919,7 @@
           <a:p>
             <a:fld id="{FF5D65A6-AB94-4435-B0B7-3743215FA46C}" type="datetime1">
               <a:rPr lang="en-US" smtClean="0"/>
-              <a:t>10/31/2015</a:t>
+              <a:t>11/3/2015</a:t>
             </a:fld>
             <a:endParaRPr lang="en-US"/>
           </a:p>
@@ -3104,7 +3104,7 @@
           <a:p>
             <a:fld id="{FF5D65A6-AB94-4435-B0B7-3743215FA46C}" type="datetime1">
               <a:rPr lang="en-US" smtClean="0"/>
-              <a:t>10/31/2015</a:t>
+              <a:t>11/3/2015</a:t>
             </a:fld>
             <a:endParaRPr lang="en-US"/>
           </a:p>
@@ -3406,7 +3406,7 @@
           <a:p>
             <a:fld id="{7C193DC4-6EF0-48C9-B29C-616106A645E1}" type="datetime1">
               <a:rPr lang="en-US" smtClean="0"/>
-              <a:t>10/31/2015</a:t>
+              <a:t>11/3/2015</a:t>
             </a:fld>
             <a:endParaRPr lang="en-US"/>
           </a:p>
@@ -3694,7 +3694,7 @@
           <a:p>
             <a:fld id="{5D1846AD-9252-4647-9435-4C2AC365653A}" type="datetime1">
               <a:rPr lang="en-US" smtClean="0"/>
-              <a:t>10/31/2015</a:t>
+              <a:t>11/3/2015</a:t>
             </a:fld>
             <a:endParaRPr lang="en-US"/>
           </a:p>
@@ -4116,7 +4116,7 @@
           <a:p>
             <a:fld id="{CE56DC10-3561-4063-A6AF-C1CC7A41040A}" type="datetime1">
               <a:rPr lang="en-US" smtClean="0"/>
-              <a:t>10/31/2015</a:t>
+              <a:t>11/3/2015</a:t>
             </a:fld>
             <a:endParaRPr lang="en-US"/>
           </a:p>
@@ -4234,7 +4234,7 @@
           <a:p>
             <a:fld id="{2F7B77F5-1464-4F6B-92A8-64FC8A508293}" type="datetime1">
               <a:rPr lang="en-US" smtClean="0"/>
-              <a:t>10/31/2015</a:t>
+              <a:t>11/3/2015</a:t>
             </a:fld>
             <a:endParaRPr lang="en-US"/>
           </a:p>
@@ -4466,7 +4466,7 @@
           <a:p>
             <a:fld id="{02B3F677-983B-48DB-ADFD-63FE6CBC7FB2}" type="datetime1">
               <a:rPr lang="en-US" smtClean="0"/>
-              <a:t>10/31/2015</a:t>
+              <a:t>11/3/2015</a:t>
             </a:fld>
             <a:endParaRPr lang="en-US"/>
           </a:p>
@@ -6890,8 +6890,54 @@
             </a:r>
             <a:r>
               <a:rPr lang="en-US" dirty="0" smtClean="0"/>
-              <a:t> S) is the smallest set of nodes such that (all-successors S) is a subset of S.</a:t>
-            </a:r>
+              <a:t> S) is the smallest set </a:t>
+            </a:r>
+            <a:r>
+              <a:rPr lang="en-US" dirty="0" smtClean="0"/>
+              <a:t>R of </a:t>
+            </a:r>
+            <a:r>
+              <a:rPr lang="en-US" dirty="0" smtClean="0"/>
+              <a:t>nodes such that </a:t>
+            </a:r>
+            <a:endParaRPr lang="en-US" dirty="0" smtClean="0"/>
+          </a:p>
+          <a:p>
+            <a:pPr marL="971550" lvl="1" indent="-514350">
+              <a:buFont typeface="+mj-lt"/>
+              <a:buAutoNum type="arabicPeriod"/>
+            </a:pPr>
+            <a:r>
+              <a:rPr lang="en-US" dirty="0" smtClean="0"/>
+              <a:t>S is a subset of R</a:t>
+            </a:r>
+          </a:p>
+          <a:p>
+            <a:pPr marL="971550" lvl="1" indent="-514350">
+              <a:buFont typeface="+mj-lt"/>
+              <a:buAutoNum type="arabicPeriod"/>
+            </a:pPr>
+            <a:r>
+              <a:rPr lang="en-US" dirty="0" smtClean="0"/>
+              <a:t>(all-successors </a:t>
+            </a:r>
+            <a:r>
+              <a:rPr lang="en-US" dirty="0" smtClean="0"/>
+              <a:t>R</a:t>
+            </a:r>
+            <a:r>
+              <a:rPr lang="en-US" dirty="0" smtClean="0"/>
+              <a:t>) </a:t>
+            </a:r>
+            <a:r>
+              <a:rPr lang="en-US" dirty="0" smtClean="0"/>
+              <a:t>is a subset of </a:t>
+            </a:r>
+            <a:r>
+              <a:rPr lang="en-US" dirty="0" smtClean="0"/>
+              <a:t>R.</a:t>
+            </a:r>
+            <a:endParaRPr lang="en-US" dirty="0" smtClean="0"/>
           </a:p>
           <a:p>
             <a:endParaRPr lang="en-US" dirty="0"/>
@@ -7997,7 +8043,7 @@
         <p:spPr>
           <a:xfrm>
             <a:off x="4990891" y="5257800"/>
-            <a:ext cx="4076909" cy="830997"/>
+            <a:ext cx="4076909" cy="1200329"/>
           </a:xfrm>
           <a:prstGeom prst="rect">
             <a:avLst/>
@@ -8025,7 +8071,11 @@
           <a:p>
             <a:r>
               <a:rPr lang="en-US" sz="2400" dirty="0" smtClean="0"/>
-              <a:t>not closed under successors: more </a:t>
+              <a:t>This R is not </a:t>
+            </a:r>
+            <a:r>
+              <a:rPr lang="en-US" sz="2400" dirty="0" smtClean="0"/>
+              <a:t>closed under successors: more </a:t>
             </a:r>
             <a:r>
               <a:rPr lang="en-US" sz="2400" dirty="0" err="1" smtClean="0"/>
@@ -9635,8 +9685,8 @@
         </p:nvSpPr>
         <p:spPr>
           <a:xfrm>
-            <a:off x="3865516" y="5794569"/>
-            <a:ext cx="5085366" cy="461665"/>
+            <a:off x="4052710" y="5438847"/>
+            <a:ext cx="4668884" cy="1200329"/>
           </a:xfrm>
           <a:prstGeom prst="rect">
             <a:avLst/>
@@ -9657,14 +9707,22 @@
           </a:fontRef>
         </p:style>
         <p:txBody>
-          <a:bodyPr wrap="none" rtlCol="0">
+          <a:bodyPr wrap="square" rtlCol="0">
             <a:spAutoFit/>
           </a:bodyPr>
           <a:lstStyle/>
           <a:p>
             <a:r>
               <a:rPr lang="en-US" sz="2400" dirty="0" smtClean="0"/>
-              <a:t>(</a:t>
+              <a:t>The R contains S as a subset and is closed </a:t>
+            </a:r>
+            <a:r>
+              <a:rPr lang="en-US" sz="2400" dirty="0" smtClean="0"/>
+              <a:t>under </a:t>
+            </a:r>
+            <a:r>
+              <a:rPr lang="en-US" sz="2400" dirty="0" smtClean="0"/>
+              <a:t>successors.  So it is (</a:t>
             </a:r>
             <a:r>
               <a:rPr lang="en-US" sz="2400" dirty="0" err="1" smtClean="0"/>
@@ -9672,7 +9730,7 @@
             </a:r>
             <a:r>
               <a:rPr lang="en-US" sz="2400" dirty="0" smtClean="0"/>
-              <a:t> S): closed under successors</a:t>
+              <a:t> S)</a:t>
             </a:r>
             <a:endParaRPr lang="en-US" sz="2400" dirty="0"/>
           </a:p>
@@ -10519,7 +10577,7 @@
         <p:spPr>
           <a:xfrm>
             <a:off x="6387152" y="4012442"/>
-            <a:ext cx="1308354" cy="1787857"/>
+            <a:ext cx="1308354" cy="1426405"/>
           </a:xfrm>
           <a:custGeom>
             <a:avLst/>
@@ -10667,7 +10725,19 @@
           <a:p>
             <a:r>
               <a:rPr lang="en-US" dirty="0" smtClean="0"/>
-              <a:t>This is called a "closure problem": we want to find the smallest set S which is closed under some operation</a:t>
+              <a:t>This is called a "closure problem": we want to find the smallest set </a:t>
+            </a:r>
+            <a:r>
+              <a:rPr lang="en-US" dirty="0" smtClean="0"/>
+              <a:t>R which contains our starting set S and </a:t>
+            </a:r>
+            <a:r>
+              <a:rPr lang="en-US" dirty="0" smtClean="0"/>
+              <a:t>which </a:t>
+            </a:r>
+            <a:r>
+              <a:rPr lang="en-US" dirty="0" smtClean="0"/>
+              <a:t>is closed under some operation</a:t>
             </a:r>
           </a:p>
           <a:p>
@@ -20277,11 +20347,7 @@
             </a:r>
             <a:r>
               <a:rPr lang="en-US" smtClean="0"/>
-              <a:t>and </a:t>
-            </a:r>
-            <a:r>
-              <a:rPr lang="en-US" smtClean="0"/>
-              <a:t>what it </a:t>
+              <a:t>and what it </a:t>
             </a:r>
             <a:r>
               <a:rPr lang="en-US" dirty="0" smtClean="0"/>

</xml_diff>

<commit_message>
assorted tweaks & fixed typos
</commit_message>
<xml_diff>
--- a/Slides/Lesson 8.4 Searching in a Graph.pptx
+++ b/Slides/Lesson 8.4 Searching in a Graph.pptx
@@ -261,7 +261,7 @@
             <a:fld id="{CF8F25F6-E1EF-4065-8525-42EDEBD9BD22}" type="datetimeFigureOut">
               <a:rPr lang="en-US" smtClean="0"/>
               <a:pPr/>
-              <a:t>11/3/2015</a:t>
+              <a:t>11/4/2015</a:t>
             </a:fld>
             <a:endParaRPr lang="en-US"/>
           </a:p>
@@ -1310,7 +1310,7 @@
           <a:p>
             <a:fld id="{2F1F79F5-7BEC-496A-AFC7-876E38F64D71}" type="datetime1">
               <a:rPr lang="en-US" smtClean="0"/>
-              <a:t>11/3/2015</a:t>
+              <a:t>11/4/2015</a:t>
             </a:fld>
             <a:endParaRPr lang="en-US"/>
           </a:p>
@@ -1412,7 +1412,7 @@
           <a:p>
             <a:fld id="{0A05703A-7669-4FEA-9056-25299B4D29D4}" type="datetime1">
               <a:rPr lang="en-US" smtClean="0"/>
-              <a:t>11/3/2015</a:t>
+              <a:t>11/4/2015</a:t>
             </a:fld>
             <a:endParaRPr lang="en-US"/>
           </a:p>
@@ -1689,7 +1689,7 @@
           <a:p>
             <a:fld id="{6E5077B5-BB57-49DB-88CA-226A139E5C01}" type="datetime1">
               <a:rPr lang="en-US" smtClean="0"/>
-              <a:t>11/3/2015</a:t>
+              <a:t>11/4/2015</a:t>
             </a:fld>
             <a:endParaRPr lang="en-US"/>
           </a:p>
@@ -1942,7 +1942,7 @@
           <a:p>
             <a:fld id="{C48D9447-CBD6-49A1-89FD-8512A8CF8999}" type="datetime1">
               <a:rPr lang="en-US" smtClean="0"/>
-              <a:t>11/3/2015</a:t>
+              <a:t>11/4/2015</a:t>
             </a:fld>
             <a:endParaRPr lang="en-US"/>
           </a:p>
@@ -2112,7 +2112,7 @@
           <a:p>
             <a:fld id="{A3639A2A-823D-48B7-9ACE-7FAF42870BA9}" type="datetime1">
               <a:rPr lang="en-US" smtClean="0"/>
-              <a:t>11/3/2015</a:t>
+              <a:t>11/4/2015</a:t>
             </a:fld>
             <a:endParaRPr lang="en-US"/>
           </a:p>
@@ -2292,7 +2292,7 @@
           <a:p>
             <a:fld id="{ED1B6996-82E9-463C-972C-7B56056E426C}" type="datetime1">
               <a:rPr lang="en-US" smtClean="0"/>
-              <a:t>11/3/2015</a:t>
+              <a:t>11/4/2015</a:t>
             </a:fld>
             <a:endParaRPr lang="en-US"/>
           </a:p>
@@ -2468,7 +2468,7 @@
           <a:p>
             <a:fld id="{E22ED4DA-448D-4BB1-B935-CC112220207B}" type="datetime1">
               <a:rPr lang="en-US" smtClean="0"/>
-              <a:t>11/3/2015</a:t>
+              <a:t>11/4/2015</a:t>
             </a:fld>
             <a:endParaRPr lang="en-US"/>
           </a:p>
@@ -2650,7 +2650,7 @@
           <a:p>
             <a:fld id="{E22ED4DA-448D-4BB1-B935-CC112220207B}" type="datetime1">
               <a:rPr lang="en-US" smtClean="0"/>
-              <a:t>11/3/2015</a:t>
+              <a:t>11/4/2015</a:t>
             </a:fld>
             <a:endParaRPr lang="en-US"/>
           </a:p>
@@ -2919,7 +2919,7 @@
           <a:p>
             <a:fld id="{FF5D65A6-AB94-4435-B0B7-3743215FA46C}" type="datetime1">
               <a:rPr lang="en-US" smtClean="0"/>
-              <a:t>11/3/2015</a:t>
+              <a:t>11/4/2015</a:t>
             </a:fld>
             <a:endParaRPr lang="en-US"/>
           </a:p>
@@ -3104,7 +3104,7 @@
           <a:p>
             <a:fld id="{FF5D65A6-AB94-4435-B0B7-3743215FA46C}" type="datetime1">
               <a:rPr lang="en-US" smtClean="0"/>
-              <a:t>11/3/2015</a:t>
+              <a:t>11/4/2015</a:t>
             </a:fld>
             <a:endParaRPr lang="en-US"/>
           </a:p>
@@ -3406,7 +3406,7 @@
           <a:p>
             <a:fld id="{7C193DC4-6EF0-48C9-B29C-616106A645E1}" type="datetime1">
               <a:rPr lang="en-US" smtClean="0"/>
-              <a:t>11/3/2015</a:t>
+              <a:t>11/4/2015</a:t>
             </a:fld>
             <a:endParaRPr lang="en-US"/>
           </a:p>
@@ -3694,7 +3694,7 @@
           <a:p>
             <a:fld id="{5D1846AD-9252-4647-9435-4C2AC365653A}" type="datetime1">
               <a:rPr lang="en-US" smtClean="0"/>
-              <a:t>11/3/2015</a:t>
+              <a:t>11/4/2015</a:t>
             </a:fld>
             <a:endParaRPr lang="en-US"/>
           </a:p>
@@ -4116,7 +4116,7 @@
           <a:p>
             <a:fld id="{CE56DC10-3561-4063-A6AF-C1CC7A41040A}" type="datetime1">
               <a:rPr lang="en-US" smtClean="0"/>
-              <a:t>11/3/2015</a:t>
+              <a:t>11/4/2015</a:t>
             </a:fld>
             <a:endParaRPr lang="en-US"/>
           </a:p>
@@ -4234,7 +4234,7 @@
           <a:p>
             <a:fld id="{2F7B77F5-1464-4F6B-92A8-64FC8A508293}" type="datetime1">
               <a:rPr lang="en-US" smtClean="0"/>
-              <a:t>11/3/2015</a:t>
+              <a:t>11/4/2015</a:t>
             </a:fld>
             <a:endParaRPr lang="en-US"/>
           </a:p>
@@ -4466,7 +4466,7 @@
           <a:p>
             <a:fld id="{02B3F677-983B-48DB-ADFD-63FE6CBC7FB2}" type="datetime1">
               <a:rPr lang="en-US" smtClean="0"/>
-              <a:t>11/3/2015</a:t>
+              <a:t>11/4/2015</a:t>
             </a:fld>
             <a:endParaRPr lang="en-US"/>
           </a:p>
@@ -6890,17 +6890,8 @@
             </a:r>
             <a:r>
               <a:rPr lang="en-US" dirty="0" smtClean="0"/>
-              <a:t> S) is the smallest set </a:t>
-            </a:r>
-            <a:r>
-              <a:rPr lang="en-US" dirty="0" smtClean="0"/>
-              <a:t>R of </a:t>
-            </a:r>
-            <a:r>
-              <a:rPr lang="en-US" dirty="0" smtClean="0"/>
-              <a:t>nodes such that </a:t>
-            </a:r>
-            <a:endParaRPr lang="en-US" dirty="0" smtClean="0"/>
+              <a:t> S) is the smallest set R of nodes such that </a:t>
+            </a:r>
           </a:p>
           <a:p>
             <a:pPr marL="971550" lvl="1" indent="-514350">
@@ -6919,25 +6910,8 @@
             </a:pPr>
             <a:r>
               <a:rPr lang="en-US" dirty="0" smtClean="0"/>
-              <a:t>(all-successors </a:t>
-            </a:r>
-            <a:r>
-              <a:rPr lang="en-US" dirty="0" smtClean="0"/>
-              <a:t>R</a:t>
-            </a:r>
-            <a:r>
-              <a:rPr lang="en-US" dirty="0" smtClean="0"/>
-              <a:t>) </a:t>
-            </a:r>
-            <a:r>
-              <a:rPr lang="en-US" dirty="0" smtClean="0"/>
-              <a:t>is a subset of </a:t>
-            </a:r>
-            <a:r>
-              <a:rPr lang="en-US" dirty="0" smtClean="0"/>
-              <a:t>R.</a:t>
-            </a:r>
-            <a:endParaRPr lang="en-US" dirty="0" smtClean="0"/>
+              <a:t>(all-successors R) is a subset of R.</a:t>
+            </a:r>
           </a:p>
           <a:p>
             <a:endParaRPr lang="en-US" dirty="0"/>
@@ -8071,11 +8045,7 @@
           <a:p>
             <a:r>
               <a:rPr lang="en-US" sz="2400" dirty="0" smtClean="0"/>
-              <a:t>This R is not </a:t>
-            </a:r>
-            <a:r>
-              <a:rPr lang="en-US" sz="2400" dirty="0" smtClean="0"/>
-              <a:t>closed under successors: more </a:t>
+              <a:t>This R is not closed under successors: more </a:t>
             </a:r>
             <a:r>
               <a:rPr lang="en-US" sz="2400" dirty="0" err="1" smtClean="0"/>
@@ -9714,15 +9684,7 @@
           <a:p>
             <a:r>
               <a:rPr lang="en-US" sz="2400" dirty="0" smtClean="0"/>
-              <a:t>The R contains S as a subset and is closed </a:t>
-            </a:r>
-            <a:r>
-              <a:rPr lang="en-US" sz="2400" dirty="0" smtClean="0"/>
-              <a:t>under </a:t>
-            </a:r>
-            <a:r>
-              <a:rPr lang="en-US" sz="2400" dirty="0" smtClean="0"/>
-              <a:t>successors.  So it is (</a:t>
+              <a:t>The R contains S as a subset and is closed under successors.  So it is (</a:t>
             </a:r>
             <a:r>
               <a:rPr lang="en-US" sz="2400" dirty="0" err="1" smtClean="0"/>
@@ -10725,19 +10687,7 @@
           <a:p>
             <a:r>
               <a:rPr lang="en-US" dirty="0" smtClean="0"/>
-              <a:t>This is called a "closure problem": we want to find the smallest set </a:t>
-            </a:r>
-            <a:r>
-              <a:rPr lang="en-US" dirty="0" smtClean="0"/>
-              <a:t>R which contains our starting set S and </a:t>
-            </a:r>
-            <a:r>
-              <a:rPr lang="en-US" dirty="0" smtClean="0"/>
-              <a:t>which </a:t>
-            </a:r>
-            <a:r>
-              <a:rPr lang="en-US" dirty="0" smtClean="0"/>
-              <a:t>is closed under some operation</a:t>
+              <a:t>This is called a "closure problem": we want to find the smallest set R which contains our starting set S and which is closed under some operation</a:t>
             </a:r>
           </a:p>
           <a:p>
@@ -15656,8 +15606,13 @@
           <a:p>
             <a:r>
               <a:rPr lang="en-US" sz="1200" dirty="0" smtClean="0"/>
-              <a:t>    ((define candidates (set-minus </a:t>
-            </a:r>
+              <a:t>    ((define candidates </a:t>
+            </a:r>
+            <a:r>
+              <a:rPr lang="en-US" sz="1200" dirty="0" smtClean="0"/>
+              <a:t>(set-diff </a:t>
+            </a:r>
+            <a:endParaRPr lang="en-US" sz="1200" dirty="0" smtClean="0"/>
           </a:p>
           <a:p>
             <a:r>
@@ -18278,7 +18233,11 @@
           <a:p>
             <a:r>
               <a:rPr lang="en-US" sz="2000" dirty="0" smtClean="0"/>
-              <a:t>(define (all-successors-</a:t>
+              <a:t>(define </a:t>
+            </a:r>
+            <a:r>
+              <a:rPr lang="en-US" sz="2000" smtClean="0"/>
+              <a:t>(make-all-successors-</a:t>
             </a:r>
             <a:r>
               <a:rPr lang="en-US" sz="2000" dirty="0" err="1" smtClean="0"/>
@@ -18286,7 +18245,11 @@
             </a:r>
             <a:r>
               <a:rPr lang="en-US" sz="2000" dirty="0" smtClean="0"/>
-              <a:t> g)</a:t>
+              <a:t> </a:t>
+            </a:r>
+            <a:r>
+              <a:rPr lang="en-US" sz="2000" dirty="0" smtClean="0"/>
+              <a:t>g)</a:t>
             </a:r>
           </a:p>
           <a:p>

</xml_diff>